<commit_message>
Update lecture 2.  Add assignment 2
</commit_message>
<xml_diff>
--- a/Week 2/02 - x86 Processor Achitecture.pptx
+++ b/Week 2/02 - x86 Processor Achitecture.pptx
@@ -5,18 +5,23 @@
     <p:sldMasterId id="2147483648" r:id="rId1"/>
   </p:sldMasterIdLst>
   <p:notesMasterIdLst>
-    <p:notesMasterId r:id="rId3"/>
+    <p:notesMasterId r:id="rId8"/>
   </p:notesMasterIdLst>
   <p:handoutMasterIdLst>
-    <p:handoutMasterId r:id="rId4"/>
+    <p:handoutMasterId r:id="rId9"/>
   </p:handoutMasterIdLst>
   <p:sldIdLst>
     <p:sldId id="265" r:id="rId2"/>
+    <p:sldId id="266" r:id="rId3"/>
+    <p:sldId id="267" r:id="rId4"/>
+    <p:sldId id="270" r:id="rId5"/>
+    <p:sldId id="268" r:id="rId6"/>
+    <p:sldId id="269" r:id="rId7"/>
   </p:sldIdLst>
   <p:sldSz cx="12188825" cy="6858000"/>
   <p:notesSz cx="6858000" cy="9144000"/>
   <p:custDataLst>
-    <p:tags r:id="rId5"/>
+    <p:tags r:id="rId10"/>
   </p:custDataLst>
   <p:defaultTextStyle>
     <a:defPPr>
@@ -221,7 +226,7 @@
           <a:p>
             <a:fld id="{59088EAF-6ECA-4616-85EF-35AA19C641F3}" type="datetimeFigureOut">
               <a:rPr lang="en-US"/>
-              <a:t>2/13/2018</a:t>
+              <a:t>2/20/2018</a:t>
             </a:fld>
             <a:endParaRPr/>
           </a:p>
@@ -386,7 +391,7 @@
           <a:p>
             <a:fld id="{3ABD2D7A-D230-4F91-BD59-0A39C2703BA8}" type="datetimeFigureOut">
               <a:rPr lang="en-US"/>
-              <a:t>2/13/2018</a:t>
+              <a:t>2/20/2018</a:t>
             </a:fld>
             <a:endParaRPr/>
           </a:p>
@@ -995,7 +1000,7 @@
           <a:p>
             <a:fld id="{03F41C87-7AD9-4845-A077-840E4A0F3F06}" type="datetimeFigureOut">
               <a:rPr lang="en-US"/>
-              <a:t>2/13/2018</a:t>
+              <a:t>2/20/2018</a:t>
             </a:fld>
             <a:endParaRPr/>
           </a:p>
@@ -1187,7 +1192,7 @@
           <a:p>
             <a:fld id="{03F41C87-7AD9-4845-A077-840E4A0F3F06}" type="datetimeFigureOut">
               <a:rPr lang="en-US"/>
-              <a:t>2/13/2018</a:t>
+              <a:t>2/20/2018</a:t>
             </a:fld>
             <a:endParaRPr/>
           </a:p>
@@ -1376,7 +1381,7 @@
           <a:p>
             <a:fld id="{03F41C87-7AD9-4845-A077-840E4A0F3F06}" type="datetimeFigureOut">
               <a:rPr lang="en-US"/>
-              <a:t>2/13/2018</a:t>
+              <a:t>2/20/2018</a:t>
             </a:fld>
             <a:endParaRPr/>
           </a:p>
@@ -1656,7 +1661,7 @@
           <a:p>
             <a:fld id="{03F41C87-7AD9-4845-A077-840E4A0F3F06}" type="datetimeFigureOut">
               <a:rPr lang="en-US"/>
-              <a:t>2/13/2018</a:t>
+              <a:t>2/20/2018</a:t>
             </a:fld>
             <a:endParaRPr/>
           </a:p>
@@ -1960,7 +1965,7 @@
           <a:p>
             <a:fld id="{03F41C87-7AD9-4845-A077-840E4A0F3F06}" type="datetimeFigureOut">
               <a:rPr lang="en-US"/>
-              <a:t>2/13/2018</a:t>
+              <a:t>2/20/2018</a:t>
             </a:fld>
             <a:endParaRPr/>
           </a:p>
@@ -2416,7 +2421,7 @@
           <a:p>
             <a:fld id="{03F41C87-7AD9-4845-A077-840E4A0F3F06}" type="datetimeFigureOut">
               <a:rPr lang="en-US"/>
-              <a:t>2/13/2018</a:t>
+              <a:t>2/20/2018</a:t>
             </a:fld>
             <a:endParaRPr/>
           </a:p>
@@ -2546,7 +2551,7 @@
           <a:p>
             <a:fld id="{03F41C87-7AD9-4845-A077-840E4A0F3F06}" type="datetimeFigureOut">
               <a:rPr lang="en-US"/>
-              <a:t>2/13/2018</a:t>
+              <a:t>2/20/2018</a:t>
             </a:fld>
             <a:endParaRPr/>
           </a:p>
@@ -2661,7 +2666,7 @@
           <a:p>
             <a:fld id="{03F41C87-7AD9-4845-A077-840E4A0F3F06}" type="datetimeFigureOut">
               <a:rPr lang="en-US"/>
-              <a:t>2/13/2018</a:t>
+              <a:t>2/20/2018</a:t>
             </a:fld>
             <a:endParaRPr/>
           </a:p>
@@ -2983,7 +2988,7 @@
           <a:p>
             <a:fld id="{03F41C87-7AD9-4845-A077-840E4A0F3F06}" type="datetimeFigureOut">
               <a:rPr lang="en-US"/>
-              <a:t>2/13/2018</a:t>
+              <a:t>2/20/2018</a:t>
             </a:fld>
             <a:endParaRPr/>
           </a:p>
@@ -3295,7 +3300,7 @@
             <a:fld id="{03F41C87-7AD9-4845-A077-840E4A0F3F06}" type="datetimeFigureOut">
               <a:rPr lang="en-US"/>
               <a:pPr/>
-              <a:t>2/13/2018</a:t>
+              <a:t>2/20/2018</a:t>
             </a:fld>
             <a:endParaRPr/>
           </a:p>
@@ -3549,7 +3554,7 @@
             <a:fld id="{03F41C87-7AD9-4845-A077-840E4A0F3F06}" type="datetimeFigureOut">
               <a:rPr lang="en-US" smtClean="0"/>
               <a:pPr/>
-              <a:t>2/13/2018</a:t>
+              <a:t>2/20/2018</a:t>
             </a:fld>
             <a:endParaRPr lang="en-US"/>
           </a:p>
@@ -4014,6 +4019,1046 @@
     <p:extLst>
       <p:ext uri="{BB962C8B-B14F-4D97-AF65-F5344CB8AC3E}">
         <p14:creationId xmlns:p14="http://schemas.microsoft.com/office/powerpoint/2010/main" val="2808920126"/>
+      </p:ext>
+    </p:extLst>
+  </p:cSld>
+  <p:clrMapOvr>
+    <a:masterClrMapping/>
+  </p:clrMapOvr>
+  <mc:AlternateContent xmlns:mc="http://schemas.openxmlformats.org/markup-compatibility/2006" xmlns:p14="http://schemas.microsoft.com/office/powerpoint/2010/main">
+    <mc:Choice Requires="p14">
+      <p:transition spd="med" p14:dur="700">
+        <p:fade/>
+      </p:transition>
+    </mc:Choice>
+    <mc:Fallback xmlns="">
+      <p:transition spd="med">
+        <p:fade/>
+      </p:transition>
+    </mc:Fallback>
+  </mc:AlternateContent>
+</p:sld>
+</file>
+
+<file path=ppt/slides/slide2.xml><?xml version="1.0" encoding="utf-8"?>
+<p:sld xmlns:a="http://schemas.openxmlformats.org/drawingml/2006/main" xmlns:r="http://schemas.openxmlformats.org/officeDocument/2006/relationships" xmlns:p="http://schemas.openxmlformats.org/presentationml/2006/main">
+  <p:cSld>
+    <p:spTree>
+      <p:nvGrpSpPr>
+        <p:cNvPr id="1" name=""/>
+        <p:cNvGrpSpPr/>
+        <p:nvPr/>
+      </p:nvGrpSpPr>
+      <p:grpSpPr>
+        <a:xfrm>
+          <a:off x="0" y="0"/>
+          <a:ext cx="0" cy="0"/>
+          <a:chOff x="0" y="0"/>
+          <a:chExt cx="0" cy="0"/>
+        </a:xfrm>
+      </p:grpSpPr>
+      <p:sp>
+        <p:nvSpPr>
+          <p:cNvPr id="2" name="Title 1"/>
+          <p:cNvSpPr>
+            <a:spLocks noGrp="1"/>
+          </p:cNvSpPr>
+          <p:nvPr>
+            <p:ph type="title"/>
+          </p:nvPr>
+        </p:nvSpPr>
+        <p:spPr/>
+        <p:txBody>
+          <a:bodyPr/>
+          <a:lstStyle/>
+          <a:p>
+            <a:r>
+              <a:rPr lang="en-US" dirty="0" smtClean="0"/>
+              <a:t>General Concepts of Microcomputer Design</a:t>
+            </a:r>
+            <a:endParaRPr lang="en-US" dirty="0"/>
+          </a:p>
+        </p:txBody>
+      </p:sp>
+      <p:sp>
+        <p:nvSpPr>
+          <p:cNvPr id="3" name="Content Placeholder 2"/>
+          <p:cNvSpPr>
+            <a:spLocks noGrp="1"/>
+          </p:cNvSpPr>
+          <p:nvPr>
+            <p:ph idx="1"/>
+          </p:nvPr>
+        </p:nvSpPr>
+        <p:spPr>
+          <a:xfrm>
+            <a:off x="1522413" y="1904999"/>
+            <a:ext cx="2666999" cy="4114801"/>
+          </a:xfrm>
+        </p:spPr>
+        <p:txBody>
+          <a:bodyPr>
+            <a:normAutofit fontScale="92500" lnSpcReduction="10000"/>
+          </a:bodyPr>
+          <a:lstStyle/>
+          <a:p>
+            <a:r>
+              <a:rPr lang="en-US" dirty="0" smtClean="0"/>
+              <a:t>CPU</a:t>
+            </a:r>
+          </a:p>
+          <a:p>
+            <a:pPr lvl="1"/>
+            <a:r>
+              <a:rPr lang="en-US" dirty="0" smtClean="0"/>
+              <a:t>Registers</a:t>
+            </a:r>
+          </a:p>
+          <a:p>
+            <a:pPr lvl="1"/>
+            <a:r>
+              <a:rPr lang="en-US" dirty="0" smtClean="0"/>
+              <a:t>ALU</a:t>
+            </a:r>
+          </a:p>
+          <a:p>
+            <a:pPr lvl="1"/>
+            <a:r>
+              <a:rPr lang="en-US" dirty="0" smtClean="0"/>
+              <a:t>CU</a:t>
+            </a:r>
+          </a:p>
+          <a:p>
+            <a:pPr lvl="1"/>
+            <a:r>
+              <a:rPr lang="en-US" dirty="0" smtClean="0"/>
+              <a:t>Clock</a:t>
+            </a:r>
+          </a:p>
+          <a:p>
+            <a:r>
+              <a:rPr lang="en-US" dirty="0" smtClean="0"/>
+              <a:t>Buses</a:t>
+            </a:r>
+          </a:p>
+          <a:p>
+            <a:pPr lvl="1"/>
+            <a:r>
+              <a:rPr lang="en-US" dirty="0" smtClean="0"/>
+              <a:t>Data bus</a:t>
+            </a:r>
+          </a:p>
+          <a:p>
+            <a:pPr lvl="1"/>
+            <a:r>
+              <a:rPr lang="en-US" dirty="0" smtClean="0"/>
+              <a:t>Control bus</a:t>
+            </a:r>
+          </a:p>
+          <a:p>
+            <a:pPr lvl="1"/>
+            <a:r>
+              <a:rPr lang="en-US" dirty="0" smtClean="0"/>
+              <a:t>Address bus</a:t>
+            </a:r>
+          </a:p>
+          <a:p>
+            <a:r>
+              <a:rPr lang="en-US" dirty="0" smtClean="0"/>
+              <a:t>Memory</a:t>
+            </a:r>
+            <a:endParaRPr lang="en-US" dirty="0"/>
+          </a:p>
+        </p:txBody>
+      </p:sp>
+      <p:pic>
+        <p:nvPicPr>
+          <p:cNvPr id="7" name="Picture 6"/>
+          <p:cNvPicPr>
+            <a:picLocks noChangeAspect="1"/>
+          </p:cNvPicPr>
+          <p:nvPr/>
+        </p:nvPicPr>
+        <p:blipFill>
+          <a:blip r:embed="rId2"/>
+          <a:stretch>
+            <a:fillRect/>
+          </a:stretch>
+        </p:blipFill>
+        <p:spPr>
+          <a:xfrm>
+            <a:off x="3656012" y="2286000"/>
+            <a:ext cx="7246559" cy="3043237"/>
+          </a:xfrm>
+          <a:prstGeom prst="rect">
+            <a:avLst/>
+          </a:prstGeom>
+        </p:spPr>
+      </p:pic>
+    </p:spTree>
+    <p:extLst>
+      <p:ext uri="{BB962C8B-B14F-4D97-AF65-F5344CB8AC3E}">
+        <p14:creationId xmlns:p14="http://schemas.microsoft.com/office/powerpoint/2010/main" val="1034878585"/>
+      </p:ext>
+    </p:extLst>
+  </p:cSld>
+  <p:clrMapOvr>
+    <a:masterClrMapping/>
+  </p:clrMapOvr>
+  <mc:AlternateContent xmlns:mc="http://schemas.openxmlformats.org/markup-compatibility/2006" xmlns:p14="http://schemas.microsoft.com/office/powerpoint/2010/main">
+    <mc:Choice Requires="p14">
+      <p:transition spd="med" p14:dur="700">
+        <p:fade/>
+      </p:transition>
+    </mc:Choice>
+    <mc:Fallback xmlns="">
+      <p:transition spd="med">
+        <p:fade/>
+      </p:transition>
+    </mc:Fallback>
+  </mc:AlternateContent>
+</p:sld>
+</file>
+
+<file path=ppt/slides/slide3.xml><?xml version="1.0" encoding="utf-8"?>
+<p:sld xmlns:a="http://schemas.openxmlformats.org/drawingml/2006/main" xmlns:r="http://schemas.openxmlformats.org/officeDocument/2006/relationships" xmlns:p="http://schemas.openxmlformats.org/presentationml/2006/main">
+  <p:cSld>
+    <p:spTree>
+      <p:nvGrpSpPr>
+        <p:cNvPr id="1" name=""/>
+        <p:cNvGrpSpPr/>
+        <p:nvPr/>
+      </p:nvGrpSpPr>
+      <p:grpSpPr>
+        <a:xfrm>
+          <a:off x="0" y="0"/>
+          <a:ext cx="0" cy="0"/>
+          <a:chOff x="0" y="0"/>
+          <a:chExt cx="0" cy="0"/>
+        </a:xfrm>
+      </p:grpSpPr>
+      <p:sp>
+        <p:nvSpPr>
+          <p:cNvPr id="2" name="Title 1"/>
+          <p:cNvSpPr>
+            <a:spLocks noGrp="1"/>
+          </p:cNvSpPr>
+          <p:nvPr>
+            <p:ph type="title"/>
+          </p:nvPr>
+        </p:nvSpPr>
+        <p:spPr/>
+        <p:txBody>
+          <a:bodyPr/>
+          <a:lstStyle/>
+          <a:p>
+            <a:r>
+              <a:rPr lang="en-US" dirty="0" smtClean="0"/>
+              <a:t>Instruction Execution Cycle</a:t>
+            </a:r>
+            <a:endParaRPr lang="en-US" dirty="0"/>
+          </a:p>
+        </p:txBody>
+      </p:sp>
+      <p:sp>
+        <p:nvSpPr>
+          <p:cNvPr id="3" name="Content Placeholder 2"/>
+          <p:cNvSpPr>
+            <a:spLocks noGrp="1"/>
+          </p:cNvSpPr>
+          <p:nvPr>
+            <p:ph idx="1"/>
+          </p:nvPr>
+        </p:nvSpPr>
+        <p:spPr>
+          <a:xfrm>
+            <a:off x="1510363" y="1905000"/>
+            <a:ext cx="2755250" cy="4114801"/>
+          </a:xfrm>
+        </p:spPr>
+        <p:txBody>
+          <a:bodyPr/>
+          <a:lstStyle/>
+          <a:p>
+            <a:r>
+              <a:rPr lang="en-US" dirty="0" smtClean="0"/>
+              <a:t>Fetch</a:t>
+            </a:r>
+          </a:p>
+          <a:p>
+            <a:r>
+              <a:rPr lang="en-US" dirty="0" smtClean="0"/>
+              <a:t>Decode</a:t>
+            </a:r>
+          </a:p>
+          <a:p>
+            <a:r>
+              <a:rPr lang="en-US" dirty="0" smtClean="0"/>
+              <a:t>Execute</a:t>
+            </a:r>
+          </a:p>
+          <a:p>
+            <a:r>
+              <a:rPr lang="en-US" dirty="0" smtClean="0"/>
+              <a:t>(optional) Store</a:t>
+            </a:r>
+            <a:endParaRPr lang="en-US" dirty="0"/>
+          </a:p>
+        </p:txBody>
+      </p:sp>
+      <p:pic>
+        <p:nvPicPr>
+          <p:cNvPr id="4" name="Picture 3"/>
+          <p:cNvPicPr>
+            <a:picLocks noChangeAspect="1"/>
+          </p:cNvPicPr>
+          <p:nvPr/>
+        </p:nvPicPr>
+        <p:blipFill>
+          <a:blip r:embed="rId2"/>
+          <a:stretch>
+            <a:fillRect/>
+          </a:stretch>
+        </p:blipFill>
+        <p:spPr>
+          <a:xfrm>
+            <a:off x="4494212" y="1828800"/>
+            <a:ext cx="5904667" cy="4648200"/>
+          </a:xfrm>
+          <a:prstGeom prst="rect">
+            <a:avLst/>
+          </a:prstGeom>
+        </p:spPr>
+      </p:pic>
+    </p:spTree>
+    <p:extLst>
+      <p:ext uri="{BB962C8B-B14F-4D97-AF65-F5344CB8AC3E}">
+        <p14:creationId xmlns:p14="http://schemas.microsoft.com/office/powerpoint/2010/main" val="3371951556"/>
+      </p:ext>
+    </p:extLst>
+  </p:cSld>
+  <p:clrMapOvr>
+    <a:masterClrMapping/>
+  </p:clrMapOvr>
+  <mc:AlternateContent xmlns:mc="http://schemas.openxmlformats.org/markup-compatibility/2006" xmlns:p14="http://schemas.microsoft.com/office/powerpoint/2010/main">
+    <mc:Choice Requires="p14">
+      <p:transition spd="med" p14:dur="700">
+        <p:fade/>
+      </p:transition>
+    </mc:Choice>
+    <mc:Fallback xmlns="">
+      <p:transition spd="med">
+        <p:fade/>
+      </p:transition>
+    </mc:Fallback>
+  </mc:AlternateContent>
+</p:sld>
+</file>
+
+<file path=ppt/slides/slide4.xml><?xml version="1.0" encoding="utf-8"?>
+<p:sld xmlns:a="http://schemas.openxmlformats.org/drawingml/2006/main" xmlns:r="http://schemas.openxmlformats.org/officeDocument/2006/relationships" xmlns:p="http://schemas.openxmlformats.org/presentationml/2006/main">
+  <p:cSld>
+    <p:spTree>
+      <p:nvGrpSpPr>
+        <p:cNvPr id="1" name=""/>
+        <p:cNvGrpSpPr/>
+        <p:nvPr/>
+      </p:nvGrpSpPr>
+      <p:grpSpPr>
+        <a:xfrm>
+          <a:off x="0" y="0"/>
+          <a:ext cx="0" cy="0"/>
+          <a:chOff x="0" y="0"/>
+          <a:chExt cx="0" cy="0"/>
+        </a:xfrm>
+      </p:grpSpPr>
+      <p:sp>
+        <p:nvSpPr>
+          <p:cNvPr id="2" name="Title 1"/>
+          <p:cNvSpPr>
+            <a:spLocks noGrp="1"/>
+          </p:cNvSpPr>
+          <p:nvPr>
+            <p:ph type="title"/>
+          </p:nvPr>
+        </p:nvSpPr>
+        <p:spPr/>
+        <p:txBody>
+          <a:bodyPr/>
+          <a:lstStyle/>
+          <a:p>
+            <a:r>
+              <a:rPr lang="en-US" dirty="0" smtClean="0"/>
+              <a:t>Reading From Memory (page 36)</a:t>
+            </a:r>
+            <a:endParaRPr lang="en-US" dirty="0"/>
+          </a:p>
+        </p:txBody>
+      </p:sp>
+      <p:sp>
+        <p:nvSpPr>
+          <p:cNvPr id="3" name="Content Placeholder 2"/>
+          <p:cNvSpPr>
+            <a:spLocks noGrp="1"/>
+          </p:cNvSpPr>
+          <p:nvPr>
+            <p:ph idx="1"/>
+          </p:nvPr>
+        </p:nvSpPr>
+        <p:spPr/>
+        <p:txBody>
+          <a:bodyPr/>
+          <a:lstStyle/>
+          <a:p>
+            <a:r>
+              <a:rPr lang="en-US" dirty="0" smtClean="0"/>
+              <a:t>Static RAM</a:t>
+            </a:r>
+          </a:p>
+          <a:p>
+            <a:r>
+              <a:rPr lang="en-US" dirty="0" smtClean="0"/>
+              <a:t>Dynamic RAM</a:t>
+            </a:r>
+          </a:p>
+          <a:p>
+            <a:r>
+              <a:rPr lang="en-US" dirty="0" smtClean="0"/>
+              <a:t>Caching</a:t>
+            </a:r>
+          </a:p>
+          <a:p>
+            <a:pPr lvl="1"/>
+            <a:r>
+              <a:rPr lang="en-US" dirty="0" smtClean="0"/>
+              <a:t>Cache Hit</a:t>
+            </a:r>
+          </a:p>
+          <a:p>
+            <a:pPr lvl="1"/>
+            <a:r>
+              <a:rPr lang="en-US" dirty="0" smtClean="0"/>
+              <a:t>Cache Miss</a:t>
+            </a:r>
+          </a:p>
+          <a:p>
+            <a:r>
+              <a:rPr lang="en-US">
+                <a:hlinkClick r:id="rId2"/>
+              </a:rPr>
+              <a:t>http</a:t>
+            </a:r>
+            <a:r>
+              <a:rPr lang="en-US">
+                <a:hlinkClick r:id="rId2"/>
+              </a:rPr>
+              <a:t>://</a:t>
+            </a:r>
+            <a:r>
+              <a:rPr lang="en-US" smtClean="0">
+                <a:hlinkClick r:id="rId2"/>
+              </a:rPr>
+              <a:t>www-mdp.eng.cam.ac.uk/web/library/enginfo/mdp_micro/lecture1/lecture1-3-2.html</a:t>
+            </a:r>
+            <a:endParaRPr lang="en-US" smtClean="0"/>
+          </a:p>
+          <a:p>
+            <a:endParaRPr lang="en-US" dirty="0"/>
+          </a:p>
+        </p:txBody>
+      </p:sp>
+    </p:spTree>
+    <p:extLst>
+      <p:ext uri="{BB962C8B-B14F-4D97-AF65-F5344CB8AC3E}">
+        <p14:creationId xmlns:p14="http://schemas.microsoft.com/office/powerpoint/2010/main" val="3511163842"/>
+      </p:ext>
+    </p:extLst>
+  </p:cSld>
+  <p:clrMapOvr>
+    <a:masterClrMapping/>
+  </p:clrMapOvr>
+  <mc:AlternateContent xmlns:mc="http://schemas.openxmlformats.org/markup-compatibility/2006" xmlns:p14="http://schemas.microsoft.com/office/powerpoint/2010/main">
+    <mc:Choice Requires="p14">
+      <p:transition spd="med" p14:dur="700">
+        <p:fade/>
+      </p:transition>
+    </mc:Choice>
+    <mc:Fallback xmlns="">
+      <p:transition spd="med">
+        <p:fade/>
+      </p:transition>
+    </mc:Fallback>
+  </mc:AlternateContent>
+</p:sld>
+</file>
+
+<file path=ppt/slides/slide5.xml><?xml version="1.0" encoding="utf-8"?>
+<p:sld xmlns:a="http://schemas.openxmlformats.org/drawingml/2006/main" xmlns:r="http://schemas.openxmlformats.org/officeDocument/2006/relationships" xmlns:p="http://schemas.openxmlformats.org/presentationml/2006/main">
+  <p:cSld>
+    <p:spTree>
+      <p:nvGrpSpPr>
+        <p:cNvPr id="1" name=""/>
+        <p:cNvGrpSpPr/>
+        <p:nvPr/>
+      </p:nvGrpSpPr>
+      <p:grpSpPr>
+        <a:xfrm>
+          <a:off x="0" y="0"/>
+          <a:ext cx="0" cy="0"/>
+          <a:chOff x="0" y="0"/>
+          <a:chExt cx="0" cy="0"/>
+        </a:xfrm>
+      </p:grpSpPr>
+      <p:sp>
+        <p:nvSpPr>
+          <p:cNvPr id="2" name="Title 1"/>
+          <p:cNvSpPr>
+            <a:spLocks noGrp="1"/>
+          </p:cNvSpPr>
+          <p:nvPr>
+            <p:ph type="title"/>
+          </p:nvPr>
+        </p:nvSpPr>
+        <p:spPr/>
+        <p:txBody>
+          <a:bodyPr/>
+          <a:lstStyle/>
+          <a:p>
+            <a:r>
+              <a:rPr lang="en-US" dirty="0" smtClean="0"/>
+              <a:t>X86 Components</a:t>
+            </a:r>
+            <a:endParaRPr lang="en-US" dirty="0"/>
+          </a:p>
+        </p:txBody>
+      </p:sp>
+      <p:sp>
+        <p:nvSpPr>
+          <p:cNvPr id="3" name="Content Placeholder 2"/>
+          <p:cNvSpPr>
+            <a:spLocks noGrp="1"/>
+          </p:cNvSpPr>
+          <p:nvPr>
+            <p:ph idx="1"/>
+          </p:nvPr>
+        </p:nvSpPr>
+        <p:spPr/>
+        <p:txBody>
+          <a:bodyPr>
+            <a:normAutofit fontScale="70000" lnSpcReduction="20000"/>
+          </a:bodyPr>
+          <a:lstStyle/>
+          <a:p>
+            <a:r>
+              <a:rPr lang="en-US" dirty="0" smtClean="0"/>
+              <a:t>Motherboard</a:t>
+            </a:r>
+          </a:p>
+          <a:p>
+            <a:pPr lvl="1"/>
+            <a:r>
+              <a:rPr lang="en-US" dirty="0" smtClean="0"/>
+              <a:t>CPU </a:t>
+            </a:r>
+            <a:r>
+              <a:rPr lang="en-US" dirty="0" err="1" smtClean="0"/>
+              <a:t>socketer</a:t>
+            </a:r>
+            <a:endParaRPr lang="en-US" dirty="0" smtClean="0"/>
+          </a:p>
+          <a:p>
+            <a:pPr lvl="1"/>
+            <a:r>
+              <a:rPr lang="en-US" dirty="0" smtClean="0"/>
+              <a:t>Memory slots</a:t>
+            </a:r>
+          </a:p>
+          <a:p>
+            <a:pPr lvl="1"/>
+            <a:r>
+              <a:rPr lang="en-US" dirty="0" smtClean="0"/>
+              <a:t>BIOS</a:t>
+            </a:r>
+          </a:p>
+          <a:p>
+            <a:pPr lvl="1"/>
+            <a:r>
+              <a:rPr lang="en-US" dirty="0" smtClean="0"/>
+              <a:t>CMOS</a:t>
+            </a:r>
+          </a:p>
+          <a:p>
+            <a:pPr lvl="1"/>
+            <a:r>
+              <a:rPr lang="en-US" dirty="0" smtClean="0"/>
+              <a:t>Peripheral connectors</a:t>
+            </a:r>
+          </a:p>
+          <a:p>
+            <a:r>
+              <a:rPr lang="en-US" dirty="0" smtClean="0"/>
+              <a:t>Memory</a:t>
+            </a:r>
+          </a:p>
+          <a:p>
+            <a:pPr lvl="1"/>
+            <a:r>
+              <a:rPr lang="en-US" dirty="0" smtClean="0"/>
+              <a:t>ROM</a:t>
+            </a:r>
+          </a:p>
+          <a:p>
+            <a:pPr lvl="1"/>
+            <a:r>
+              <a:rPr lang="en-US" dirty="0" smtClean="0"/>
+              <a:t>EPROM</a:t>
+            </a:r>
+          </a:p>
+          <a:p>
+            <a:pPr lvl="1"/>
+            <a:r>
+              <a:rPr lang="en-US" dirty="0" smtClean="0"/>
+              <a:t>DRAM</a:t>
+            </a:r>
+          </a:p>
+          <a:p>
+            <a:pPr lvl="1"/>
+            <a:r>
+              <a:rPr lang="en-US" dirty="0" smtClean="0"/>
+              <a:t>SRAM</a:t>
+            </a:r>
+          </a:p>
+          <a:p>
+            <a:pPr lvl="1"/>
+            <a:r>
+              <a:rPr lang="en-US" dirty="0" smtClean="0"/>
+              <a:t>VRAM</a:t>
+            </a:r>
+          </a:p>
+          <a:p>
+            <a:pPr lvl="1"/>
+            <a:r>
+              <a:rPr lang="en-US" dirty="0" smtClean="0"/>
+              <a:t>CMOS</a:t>
+            </a:r>
+            <a:endParaRPr lang="en-US" dirty="0"/>
+          </a:p>
+        </p:txBody>
+      </p:sp>
+    </p:spTree>
+    <p:extLst>
+      <p:ext uri="{BB962C8B-B14F-4D97-AF65-F5344CB8AC3E}">
+        <p14:creationId xmlns:p14="http://schemas.microsoft.com/office/powerpoint/2010/main" val="2807779494"/>
+      </p:ext>
+    </p:extLst>
+  </p:cSld>
+  <p:clrMapOvr>
+    <a:masterClrMapping/>
+  </p:clrMapOvr>
+  <mc:AlternateContent xmlns:mc="http://schemas.openxmlformats.org/markup-compatibility/2006" xmlns:p14="http://schemas.microsoft.com/office/powerpoint/2010/main">
+    <mc:Choice Requires="p14">
+      <p:transition spd="med" p14:dur="700">
+        <p:fade/>
+      </p:transition>
+    </mc:Choice>
+    <mc:Fallback xmlns="">
+      <p:transition spd="med">
+        <p:fade/>
+      </p:transition>
+    </mc:Fallback>
+  </mc:AlternateContent>
+</p:sld>
+</file>
+
+<file path=ppt/slides/slide6.xml><?xml version="1.0" encoding="utf-8"?>
+<p:sld xmlns:a="http://schemas.openxmlformats.org/drawingml/2006/main" xmlns:r="http://schemas.openxmlformats.org/officeDocument/2006/relationships" xmlns:p="http://schemas.openxmlformats.org/presentationml/2006/main">
+  <p:cSld>
+    <p:spTree>
+      <p:nvGrpSpPr>
+        <p:cNvPr id="1" name=""/>
+        <p:cNvGrpSpPr/>
+        <p:nvPr/>
+      </p:nvGrpSpPr>
+      <p:grpSpPr>
+        <a:xfrm>
+          <a:off x="0" y="0"/>
+          <a:ext cx="0" cy="0"/>
+          <a:chOff x="0" y="0"/>
+          <a:chExt cx="0" cy="0"/>
+        </a:xfrm>
+      </p:grpSpPr>
+      <p:sp>
+        <p:nvSpPr>
+          <p:cNvPr id="2" name="Title 1"/>
+          <p:cNvSpPr>
+            <a:spLocks noGrp="1"/>
+          </p:cNvSpPr>
+          <p:nvPr>
+            <p:ph type="title"/>
+          </p:nvPr>
+        </p:nvSpPr>
+        <p:spPr/>
+        <p:txBody>
+          <a:bodyPr/>
+          <a:lstStyle/>
+          <a:p>
+            <a:r>
+              <a:rPr lang="en-US" dirty="0" smtClean="0"/>
+              <a:t>Input-Output</a:t>
+            </a:r>
+            <a:endParaRPr lang="en-US" dirty="0"/>
+          </a:p>
+        </p:txBody>
+      </p:sp>
+      <p:sp>
+        <p:nvSpPr>
+          <p:cNvPr id="3" name="Content Placeholder 2"/>
+          <p:cNvSpPr>
+            <a:spLocks noGrp="1"/>
+          </p:cNvSpPr>
+          <p:nvPr>
+            <p:ph idx="1"/>
+          </p:nvPr>
+        </p:nvSpPr>
+        <p:spPr>
+          <a:xfrm>
+            <a:off x="1522413" y="1904999"/>
+            <a:ext cx="2971799" cy="1752601"/>
+          </a:xfrm>
+        </p:spPr>
+        <p:txBody>
+          <a:bodyPr/>
+          <a:lstStyle/>
+          <a:p>
+            <a:r>
+              <a:rPr lang="en-US" dirty="0" smtClean="0"/>
+              <a:t>Levels of I/O Access</a:t>
+            </a:r>
+          </a:p>
+          <a:p>
+            <a:pPr lvl="1"/>
+            <a:r>
+              <a:rPr lang="en-US" dirty="0" smtClean="0"/>
+              <a:t>HLL</a:t>
+            </a:r>
+          </a:p>
+          <a:p>
+            <a:pPr lvl="1"/>
+            <a:r>
+              <a:rPr lang="en-US" dirty="0" smtClean="0"/>
+              <a:t>OS</a:t>
+            </a:r>
+          </a:p>
+          <a:p>
+            <a:pPr lvl="1"/>
+            <a:r>
+              <a:rPr lang="en-US" dirty="0" smtClean="0"/>
+              <a:t>BIOS</a:t>
+            </a:r>
+            <a:endParaRPr lang="en-US" dirty="0"/>
+          </a:p>
+        </p:txBody>
+      </p:sp>
+      <p:sp>
+        <p:nvSpPr>
+          <p:cNvPr id="4" name="Rectangle 3"/>
+          <p:cNvSpPr/>
+          <p:nvPr/>
+        </p:nvSpPr>
+        <p:spPr>
+          <a:xfrm>
+            <a:off x="5713412" y="1904999"/>
+            <a:ext cx="2895600" cy="533400"/>
+          </a:xfrm>
+          <a:prstGeom prst="rect">
+            <a:avLst/>
+          </a:prstGeom>
+        </p:spPr>
+        <p:style>
+          <a:lnRef idx="2">
+            <a:schemeClr val="accent1">
+              <a:shade val="50000"/>
+            </a:schemeClr>
+          </a:lnRef>
+          <a:fillRef idx="1">
+            <a:schemeClr val="accent1"/>
+          </a:fillRef>
+          <a:effectRef idx="0">
+            <a:schemeClr val="accent1"/>
+          </a:effectRef>
+          <a:fontRef idx="minor">
+            <a:schemeClr val="lt1"/>
+          </a:fontRef>
+        </p:style>
+        <p:txBody>
+          <a:bodyPr rtlCol="0" anchor="ctr"/>
+          <a:lstStyle/>
+          <a:p>
+            <a:pPr algn="ctr"/>
+            <a:r>
+              <a:rPr lang="en-US" dirty="0" smtClean="0"/>
+              <a:t>Application Program</a:t>
+            </a:r>
+            <a:endParaRPr lang="en-US" dirty="0"/>
+          </a:p>
+        </p:txBody>
+      </p:sp>
+      <p:sp>
+        <p:nvSpPr>
+          <p:cNvPr id="6" name="Rectangle 5"/>
+          <p:cNvSpPr/>
+          <p:nvPr/>
+        </p:nvSpPr>
+        <p:spPr>
+          <a:xfrm>
+            <a:off x="5713412" y="2895600"/>
+            <a:ext cx="2895600" cy="533400"/>
+          </a:xfrm>
+          <a:prstGeom prst="rect">
+            <a:avLst/>
+          </a:prstGeom>
+        </p:spPr>
+        <p:style>
+          <a:lnRef idx="2">
+            <a:schemeClr val="accent1">
+              <a:shade val="50000"/>
+            </a:schemeClr>
+          </a:lnRef>
+          <a:fillRef idx="1">
+            <a:schemeClr val="accent1"/>
+          </a:fillRef>
+          <a:effectRef idx="0">
+            <a:schemeClr val="accent1"/>
+          </a:effectRef>
+          <a:fontRef idx="minor">
+            <a:schemeClr val="lt1"/>
+          </a:fontRef>
+        </p:style>
+        <p:txBody>
+          <a:bodyPr rtlCol="0" anchor="ctr"/>
+          <a:lstStyle/>
+          <a:p>
+            <a:pPr algn="ctr"/>
+            <a:r>
+              <a:rPr lang="en-US" dirty="0" smtClean="0"/>
+              <a:t>OS Function</a:t>
+            </a:r>
+            <a:endParaRPr lang="en-US" dirty="0"/>
+          </a:p>
+        </p:txBody>
+      </p:sp>
+      <p:sp>
+        <p:nvSpPr>
+          <p:cNvPr id="7" name="Rectangle 6"/>
+          <p:cNvSpPr/>
+          <p:nvPr/>
+        </p:nvSpPr>
+        <p:spPr>
+          <a:xfrm>
+            <a:off x="5713412" y="3886201"/>
+            <a:ext cx="2895600" cy="533400"/>
+          </a:xfrm>
+          <a:prstGeom prst="rect">
+            <a:avLst/>
+          </a:prstGeom>
+        </p:spPr>
+        <p:style>
+          <a:lnRef idx="2">
+            <a:schemeClr val="accent1">
+              <a:shade val="50000"/>
+            </a:schemeClr>
+          </a:lnRef>
+          <a:fillRef idx="1">
+            <a:schemeClr val="accent1"/>
+          </a:fillRef>
+          <a:effectRef idx="0">
+            <a:schemeClr val="accent1"/>
+          </a:effectRef>
+          <a:fontRef idx="minor">
+            <a:schemeClr val="lt1"/>
+          </a:fontRef>
+        </p:style>
+        <p:txBody>
+          <a:bodyPr rtlCol="0" anchor="ctr"/>
+          <a:lstStyle/>
+          <a:p>
+            <a:pPr algn="ctr"/>
+            <a:r>
+              <a:rPr lang="en-US" dirty="0" smtClean="0"/>
+              <a:t>BIOS Function</a:t>
+            </a:r>
+            <a:endParaRPr lang="en-US" dirty="0"/>
+          </a:p>
+        </p:txBody>
+      </p:sp>
+      <p:sp>
+        <p:nvSpPr>
+          <p:cNvPr id="8" name="Rectangle 7"/>
+          <p:cNvSpPr/>
+          <p:nvPr/>
+        </p:nvSpPr>
+        <p:spPr>
+          <a:xfrm>
+            <a:off x="5713412" y="4876802"/>
+            <a:ext cx="2895600" cy="533400"/>
+          </a:xfrm>
+          <a:prstGeom prst="rect">
+            <a:avLst/>
+          </a:prstGeom>
+        </p:spPr>
+        <p:style>
+          <a:lnRef idx="2">
+            <a:schemeClr val="accent1">
+              <a:shade val="50000"/>
+            </a:schemeClr>
+          </a:lnRef>
+          <a:fillRef idx="1">
+            <a:schemeClr val="accent1"/>
+          </a:fillRef>
+          <a:effectRef idx="0">
+            <a:schemeClr val="accent1"/>
+          </a:effectRef>
+          <a:fontRef idx="minor">
+            <a:schemeClr val="lt1"/>
+          </a:fontRef>
+        </p:style>
+        <p:txBody>
+          <a:bodyPr rtlCol="0" anchor="ctr"/>
+          <a:lstStyle/>
+          <a:p>
+            <a:pPr algn="ctr"/>
+            <a:r>
+              <a:rPr lang="en-US" dirty="0" err="1" smtClean="0"/>
+              <a:t>Hardward</a:t>
+            </a:r>
+            <a:endParaRPr lang="en-US" dirty="0"/>
+          </a:p>
+        </p:txBody>
+      </p:sp>
+      <p:sp>
+        <p:nvSpPr>
+          <p:cNvPr id="9" name="Down Arrow 8"/>
+          <p:cNvSpPr/>
+          <p:nvPr/>
+        </p:nvSpPr>
+        <p:spPr>
+          <a:xfrm>
+            <a:off x="6932612" y="2438399"/>
+            <a:ext cx="381000" cy="457201"/>
+          </a:xfrm>
+          <a:prstGeom prst="downArrow">
+            <a:avLst/>
+          </a:prstGeom>
+        </p:spPr>
+        <p:style>
+          <a:lnRef idx="2">
+            <a:schemeClr val="accent1">
+              <a:shade val="50000"/>
+            </a:schemeClr>
+          </a:lnRef>
+          <a:fillRef idx="1">
+            <a:schemeClr val="accent1"/>
+          </a:fillRef>
+          <a:effectRef idx="0">
+            <a:schemeClr val="accent1"/>
+          </a:effectRef>
+          <a:fontRef idx="minor">
+            <a:schemeClr val="lt1"/>
+          </a:fontRef>
+        </p:style>
+        <p:txBody>
+          <a:bodyPr rtlCol="0" anchor="ctr"/>
+          <a:lstStyle/>
+          <a:p>
+            <a:pPr algn="ctr"/>
+            <a:endParaRPr lang="en-US"/>
+          </a:p>
+        </p:txBody>
+      </p:sp>
+      <p:sp>
+        <p:nvSpPr>
+          <p:cNvPr id="10" name="Down Arrow 9"/>
+          <p:cNvSpPr/>
+          <p:nvPr/>
+        </p:nvSpPr>
+        <p:spPr>
+          <a:xfrm>
+            <a:off x="6932612" y="3429000"/>
+            <a:ext cx="381000" cy="457201"/>
+          </a:xfrm>
+          <a:prstGeom prst="downArrow">
+            <a:avLst/>
+          </a:prstGeom>
+        </p:spPr>
+        <p:style>
+          <a:lnRef idx="2">
+            <a:schemeClr val="accent1">
+              <a:shade val="50000"/>
+            </a:schemeClr>
+          </a:lnRef>
+          <a:fillRef idx="1">
+            <a:schemeClr val="accent1"/>
+          </a:fillRef>
+          <a:effectRef idx="0">
+            <a:schemeClr val="accent1"/>
+          </a:effectRef>
+          <a:fontRef idx="minor">
+            <a:schemeClr val="lt1"/>
+          </a:fontRef>
+        </p:style>
+        <p:txBody>
+          <a:bodyPr rtlCol="0" anchor="ctr"/>
+          <a:lstStyle/>
+          <a:p>
+            <a:pPr algn="ctr"/>
+            <a:endParaRPr lang="en-US"/>
+          </a:p>
+        </p:txBody>
+      </p:sp>
+      <p:sp>
+        <p:nvSpPr>
+          <p:cNvPr id="11" name="Down Arrow 10"/>
+          <p:cNvSpPr/>
+          <p:nvPr/>
+        </p:nvSpPr>
+        <p:spPr>
+          <a:xfrm>
+            <a:off x="6932612" y="4419601"/>
+            <a:ext cx="381000" cy="457201"/>
+          </a:xfrm>
+          <a:prstGeom prst="downArrow">
+            <a:avLst/>
+          </a:prstGeom>
+        </p:spPr>
+        <p:style>
+          <a:lnRef idx="2">
+            <a:schemeClr val="accent1">
+              <a:shade val="50000"/>
+            </a:schemeClr>
+          </a:lnRef>
+          <a:fillRef idx="1">
+            <a:schemeClr val="accent1"/>
+          </a:fillRef>
+          <a:effectRef idx="0">
+            <a:schemeClr val="accent1"/>
+          </a:effectRef>
+          <a:fontRef idx="minor">
+            <a:schemeClr val="lt1"/>
+          </a:fontRef>
+        </p:style>
+        <p:txBody>
+          <a:bodyPr rtlCol="0" anchor="ctr"/>
+          <a:lstStyle/>
+          <a:p>
+            <a:pPr algn="ctr"/>
+            <a:endParaRPr lang="en-US"/>
+          </a:p>
+        </p:txBody>
+      </p:sp>
+    </p:spTree>
+    <p:extLst>
+      <p:ext uri="{BB962C8B-B14F-4D97-AF65-F5344CB8AC3E}">
+        <p14:creationId xmlns:p14="http://schemas.microsoft.com/office/powerpoint/2010/main" val="1026275171"/>
       </p:ext>
     </p:extLst>
   </p:cSld>

</xml_diff>